<commit_message>
Insta Mart Store Sales Dashboard Files are added
</commit_message>
<xml_diff>
--- a/Project  PPT.pptx
+++ b/Project  PPT.pptx
@@ -4,6 +4,9 @@
   <p:sldMasterIdLst>
     <p:sldMasterId id="2147483673" r:id="rId1"/>
   </p:sldMasterIdLst>
+  <p:notesMasterIdLst>
+    <p:notesMasterId r:id="rId8"/>
+  </p:notesMasterIdLst>
   <p:sldIdLst>
     <p:sldId id="256" r:id="rId2"/>
     <p:sldId id="263" r:id="rId3"/>
@@ -11669,6 +11672,439 @@
     </dgm:style>
   </dgm:styleLbl>
 </dgm:styleDef>
+</file>
+
+<file path=ppt/notesMasters/notesMaster1.xml><?xml version="1.0" encoding="utf-8"?>
+<p:notesMaster xmlns:a="http://schemas.openxmlformats.org/drawingml/2006/main" xmlns:r="http://schemas.openxmlformats.org/officeDocument/2006/relationships" xmlns:p="http://schemas.openxmlformats.org/presentationml/2006/main">
+  <p:cSld>
+    <p:bg>
+      <p:bgRef idx="1001">
+        <a:schemeClr val="bg1"/>
+      </p:bgRef>
+    </p:bg>
+    <p:spTree>
+      <p:nvGrpSpPr>
+        <p:cNvPr id="1" name=""/>
+        <p:cNvGrpSpPr/>
+        <p:nvPr/>
+      </p:nvGrpSpPr>
+      <p:grpSpPr>
+        <a:xfrm>
+          <a:off x="0" y="0"/>
+          <a:ext cx="0" cy="0"/>
+          <a:chOff x="0" y="0"/>
+          <a:chExt cx="0" cy="0"/>
+        </a:xfrm>
+      </p:grpSpPr>
+      <p:sp>
+        <p:nvSpPr>
+          <p:cNvPr id="2" name="Header Placeholder 1"/>
+          <p:cNvSpPr>
+            <a:spLocks noGrp="1"/>
+          </p:cNvSpPr>
+          <p:nvPr>
+            <p:ph type="hdr" sz="quarter"/>
+          </p:nvPr>
+        </p:nvSpPr>
+        <p:spPr>
+          <a:xfrm>
+            <a:off x="0" y="0"/>
+            <a:ext cx="2971800" cy="458788"/>
+          </a:xfrm>
+          <a:prstGeom prst="rect">
+            <a:avLst/>
+          </a:prstGeom>
+        </p:spPr>
+        <p:txBody>
+          <a:bodyPr vert="horz" lIns="91440" tIns="45720" rIns="91440" bIns="45720" rtlCol="0"/>
+          <a:lstStyle>
+            <a:lvl1pPr algn="l">
+              <a:defRPr sz="1200"/>
+            </a:lvl1pPr>
+          </a:lstStyle>
+          <a:p>
+            <a:endParaRPr lang="en-US"/>
+          </a:p>
+        </p:txBody>
+      </p:sp>
+      <p:sp>
+        <p:nvSpPr>
+          <p:cNvPr id="3" name="Date Placeholder 2"/>
+          <p:cNvSpPr>
+            <a:spLocks noGrp="1"/>
+          </p:cNvSpPr>
+          <p:nvPr>
+            <p:ph type="dt" idx="1"/>
+          </p:nvPr>
+        </p:nvSpPr>
+        <p:spPr>
+          <a:xfrm>
+            <a:off x="3884613" y="0"/>
+            <a:ext cx="2971800" cy="458788"/>
+          </a:xfrm>
+          <a:prstGeom prst="rect">
+            <a:avLst/>
+          </a:prstGeom>
+        </p:spPr>
+        <p:txBody>
+          <a:bodyPr vert="horz" lIns="91440" tIns="45720" rIns="91440" bIns="45720" rtlCol="0"/>
+          <a:lstStyle>
+            <a:lvl1pPr algn="r">
+              <a:defRPr sz="1200"/>
+            </a:lvl1pPr>
+          </a:lstStyle>
+          <a:p>
+            <a:fld id="{32E4AE61-7BD4-4643-962C-540807EE72F0}" type="datetimeFigureOut">
+              <a:rPr lang="en-US" smtClean="0"/>
+              <a:t>10/25/2025</a:t>
+            </a:fld>
+            <a:endParaRPr lang="en-US"/>
+          </a:p>
+        </p:txBody>
+      </p:sp>
+      <p:sp>
+        <p:nvSpPr>
+          <p:cNvPr id="4" name="Slide Image Placeholder 3"/>
+          <p:cNvSpPr>
+            <a:spLocks noGrp="1" noRot="1" noChangeAspect="1"/>
+          </p:cNvSpPr>
+          <p:nvPr>
+            <p:ph type="sldImg" idx="2"/>
+          </p:nvPr>
+        </p:nvSpPr>
+        <p:spPr>
+          <a:xfrm>
+            <a:off x="685800" y="1143000"/>
+            <a:ext cx="5486400" cy="3086100"/>
+          </a:xfrm>
+          <a:prstGeom prst="rect">
+            <a:avLst/>
+          </a:prstGeom>
+          <a:noFill/>
+          <a:ln w="12700">
+            <a:solidFill>
+              <a:prstClr val="black"/>
+            </a:solidFill>
+          </a:ln>
+        </p:spPr>
+        <p:txBody>
+          <a:bodyPr vert="horz" lIns="91440" tIns="45720" rIns="91440" bIns="45720" rtlCol="0" anchor="ctr"/>
+          <a:lstStyle/>
+          <a:p>
+            <a:endParaRPr lang="en-US"/>
+          </a:p>
+        </p:txBody>
+      </p:sp>
+      <p:sp>
+        <p:nvSpPr>
+          <p:cNvPr id="5" name="Notes Placeholder 4"/>
+          <p:cNvSpPr>
+            <a:spLocks noGrp="1"/>
+          </p:cNvSpPr>
+          <p:nvPr>
+            <p:ph type="body" sz="quarter" idx="3"/>
+          </p:nvPr>
+        </p:nvSpPr>
+        <p:spPr>
+          <a:xfrm>
+            <a:off x="685800" y="4400550"/>
+            <a:ext cx="5486400" cy="3600450"/>
+          </a:xfrm>
+          <a:prstGeom prst="rect">
+            <a:avLst/>
+          </a:prstGeom>
+        </p:spPr>
+        <p:txBody>
+          <a:bodyPr vert="horz" lIns="91440" tIns="45720" rIns="91440" bIns="45720" rtlCol="0"/>
+          <a:lstStyle/>
+          <a:p>
+            <a:pPr lvl="0"/>
+            <a:r>
+              <a:rPr lang="en-US"/>
+              <a:t>Click to edit Master text styles</a:t>
+            </a:r>
+          </a:p>
+          <a:p>
+            <a:pPr lvl="1"/>
+            <a:r>
+              <a:rPr lang="en-US"/>
+              <a:t>Second level</a:t>
+            </a:r>
+          </a:p>
+          <a:p>
+            <a:pPr lvl="2"/>
+            <a:r>
+              <a:rPr lang="en-US"/>
+              <a:t>Third level</a:t>
+            </a:r>
+          </a:p>
+          <a:p>
+            <a:pPr lvl="3"/>
+            <a:r>
+              <a:rPr lang="en-US"/>
+              <a:t>Fourth level</a:t>
+            </a:r>
+          </a:p>
+          <a:p>
+            <a:pPr lvl="4"/>
+            <a:r>
+              <a:rPr lang="en-US"/>
+              <a:t>Fifth level</a:t>
+            </a:r>
+          </a:p>
+        </p:txBody>
+      </p:sp>
+      <p:sp>
+        <p:nvSpPr>
+          <p:cNvPr id="6" name="Footer Placeholder 5"/>
+          <p:cNvSpPr>
+            <a:spLocks noGrp="1"/>
+          </p:cNvSpPr>
+          <p:nvPr>
+            <p:ph type="ftr" sz="quarter" idx="4"/>
+          </p:nvPr>
+        </p:nvSpPr>
+        <p:spPr>
+          <a:xfrm>
+            <a:off x="0" y="8685213"/>
+            <a:ext cx="2971800" cy="458787"/>
+          </a:xfrm>
+          <a:prstGeom prst="rect">
+            <a:avLst/>
+          </a:prstGeom>
+        </p:spPr>
+        <p:txBody>
+          <a:bodyPr vert="horz" lIns="91440" tIns="45720" rIns="91440" bIns="45720" rtlCol="0" anchor="b"/>
+          <a:lstStyle>
+            <a:lvl1pPr algn="l">
+              <a:defRPr sz="1200"/>
+            </a:lvl1pPr>
+          </a:lstStyle>
+          <a:p>
+            <a:endParaRPr lang="en-US"/>
+          </a:p>
+        </p:txBody>
+      </p:sp>
+      <p:sp>
+        <p:nvSpPr>
+          <p:cNvPr id="7" name="Slide Number Placeholder 6"/>
+          <p:cNvSpPr>
+            <a:spLocks noGrp="1"/>
+          </p:cNvSpPr>
+          <p:nvPr>
+            <p:ph type="sldNum" sz="quarter" idx="5"/>
+          </p:nvPr>
+        </p:nvSpPr>
+        <p:spPr>
+          <a:xfrm>
+            <a:off x="3884613" y="8685213"/>
+            <a:ext cx="2971800" cy="458787"/>
+          </a:xfrm>
+          <a:prstGeom prst="rect">
+            <a:avLst/>
+          </a:prstGeom>
+        </p:spPr>
+        <p:txBody>
+          <a:bodyPr vert="horz" lIns="91440" tIns="45720" rIns="91440" bIns="45720" rtlCol="0" anchor="b"/>
+          <a:lstStyle>
+            <a:lvl1pPr algn="r">
+              <a:defRPr sz="1200"/>
+            </a:lvl1pPr>
+          </a:lstStyle>
+          <a:p>
+            <a:fld id="{0994A99C-C3C3-4C26-B434-6E15DB6126A7}" type="slidenum">
+              <a:rPr lang="en-US" smtClean="0"/>
+              <a:t>‹#›</a:t>
+            </a:fld>
+            <a:endParaRPr lang="en-US"/>
+          </a:p>
+        </p:txBody>
+      </p:sp>
+    </p:spTree>
+    <p:extLst>
+      <p:ext uri="{BB962C8B-B14F-4D97-AF65-F5344CB8AC3E}">
+        <p14:creationId xmlns:p14="http://schemas.microsoft.com/office/powerpoint/2010/main" val="1644986188"/>
+      </p:ext>
+    </p:extLst>
+  </p:cSld>
+  <p:clrMap bg1="lt1" tx1="dk1" bg2="lt2" tx2="dk2" accent1="accent1" accent2="accent2" accent3="accent3" accent4="accent4" accent5="accent5" accent6="accent6" hlink="hlink" folHlink="folHlink"/>
+  <p:notesStyle>
+    <a:lvl1pPr marL="0" algn="l" defTabSz="914400" rtl="0" eaLnBrk="1" latinLnBrk="0" hangingPunct="1">
+      <a:defRPr sz="1200" kern="1200">
+        <a:solidFill>
+          <a:schemeClr val="tx1"/>
+        </a:solidFill>
+        <a:latin typeface="+mn-lt"/>
+        <a:ea typeface="+mn-ea"/>
+        <a:cs typeface="+mn-cs"/>
+      </a:defRPr>
+    </a:lvl1pPr>
+    <a:lvl2pPr marL="457200" algn="l" defTabSz="914400" rtl="0" eaLnBrk="1" latinLnBrk="0" hangingPunct="1">
+      <a:defRPr sz="1200" kern="1200">
+        <a:solidFill>
+          <a:schemeClr val="tx1"/>
+        </a:solidFill>
+        <a:latin typeface="+mn-lt"/>
+        <a:ea typeface="+mn-ea"/>
+        <a:cs typeface="+mn-cs"/>
+      </a:defRPr>
+    </a:lvl2pPr>
+    <a:lvl3pPr marL="914400" algn="l" defTabSz="914400" rtl="0" eaLnBrk="1" latinLnBrk="0" hangingPunct="1">
+      <a:defRPr sz="1200" kern="1200">
+        <a:solidFill>
+          <a:schemeClr val="tx1"/>
+        </a:solidFill>
+        <a:latin typeface="+mn-lt"/>
+        <a:ea typeface="+mn-ea"/>
+        <a:cs typeface="+mn-cs"/>
+      </a:defRPr>
+    </a:lvl3pPr>
+    <a:lvl4pPr marL="1371600" algn="l" defTabSz="914400" rtl="0" eaLnBrk="1" latinLnBrk="0" hangingPunct="1">
+      <a:defRPr sz="1200" kern="1200">
+        <a:solidFill>
+          <a:schemeClr val="tx1"/>
+        </a:solidFill>
+        <a:latin typeface="+mn-lt"/>
+        <a:ea typeface="+mn-ea"/>
+        <a:cs typeface="+mn-cs"/>
+      </a:defRPr>
+    </a:lvl4pPr>
+    <a:lvl5pPr marL="1828800" algn="l" defTabSz="914400" rtl="0" eaLnBrk="1" latinLnBrk="0" hangingPunct="1">
+      <a:defRPr sz="1200" kern="1200">
+        <a:solidFill>
+          <a:schemeClr val="tx1"/>
+        </a:solidFill>
+        <a:latin typeface="+mn-lt"/>
+        <a:ea typeface="+mn-ea"/>
+        <a:cs typeface="+mn-cs"/>
+      </a:defRPr>
+    </a:lvl5pPr>
+    <a:lvl6pPr marL="2286000" algn="l" defTabSz="914400" rtl="0" eaLnBrk="1" latinLnBrk="0" hangingPunct="1">
+      <a:defRPr sz="1200" kern="1200">
+        <a:solidFill>
+          <a:schemeClr val="tx1"/>
+        </a:solidFill>
+        <a:latin typeface="+mn-lt"/>
+        <a:ea typeface="+mn-ea"/>
+        <a:cs typeface="+mn-cs"/>
+      </a:defRPr>
+    </a:lvl6pPr>
+    <a:lvl7pPr marL="2743200" algn="l" defTabSz="914400" rtl="0" eaLnBrk="1" latinLnBrk="0" hangingPunct="1">
+      <a:defRPr sz="1200" kern="1200">
+        <a:solidFill>
+          <a:schemeClr val="tx1"/>
+        </a:solidFill>
+        <a:latin typeface="+mn-lt"/>
+        <a:ea typeface="+mn-ea"/>
+        <a:cs typeface="+mn-cs"/>
+      </a:defRPr>
+    </a:lvl7pPr>
+    <a:lvl8pPr marL="3200400" algn="l" defTabSz="914400" rtl="0" eaLnBrk="1" latinLnBrk="0" hangingPunct="1">
+      <a:defRPr sz="1200" kern="1200">
+        <a:solidFill>
+          <a:schemeClr val="tx1"/>
+        </a:solidFill>
+        <a:latin typeface="+mn-lt"/>
+        <a:ea typeface="+mn-ea"/>
+        <a:cs typeface="+mn-cs"/>
+      </a:defRPr>
+    </a:lvl8pPr>
+    <a:lvl9pPr marL="3657600" algn="l" defTabSz="914400" rtl="0" eaLnBrk="1" latinLnBrk="0" hangingPunct="1">
+      <a:defRPr sz="1200" kern="1200">
+        <a:solidFill>
+          <a:schemeClr val="tx1"/>
+        </a:solidFill>
+        <a:latin typeface="+mn-lt"/>
+        <a:ea typeface="+mn-ea"/>
+        <a:cs typeface="+mn-cs"/>
+      </a:defRPr>
+    </a:lvl9pPr>
+  </p:notesStyle>
+</p:notesMaster>
+</file>
+
+<file path=ppt/notesSlides/notesSlide1.xml><?xml version="1.0" encoding="utf-8"?>
+<p:notes xmlns:a="http://schemas.openxmlformats.org/drawingml/2006/main" xmlns:r="http://schemas.openxmlformats.org/officeDocument/2006/relationships" xmlns:p="http://schemas.openxmlformats.org/presentationml/2006/main">
+  <p:cSld>
+    <p:spTree>
+      <p:nvGrpSpPr>
+        <p:cNvPr id="1" name=""/>
+        <p:cNvGrpSpPr/>
+        <p:nvPr/>
+      </p:nvGrpSpPr>
+      <p:grpSpPr>
+        <a:xfrm>
+          <a:off x="0" y="0"/>
+          <a:ext cx="0" cy="0"/>
+          <a:chOff x="0" y="0"/>
+          <a:chExt cx="0" cy="0"/>
+        </a:xfrm>
+      </p:grpSpPr>
+      <p:sp>
+        <p:nvSpPr>
+          <p:cNvPr id="2" name="Slide Image Placeholder 1"/>
+          <p:cNvSpPr>
+            <a:spLocks noGrp="1" noRot="1" noChangeAspect="1"/>
+          </p:cNvSpPr>
+          <p:nvPr>
+            <p:ph type="sldImg"/>
+          </p:nvPr>
+        </p:nvSpPr>
+        <p:spPr/>
+      </p:sp>
+      <p:sp>
+        <p:nvSpPr>
+          <p:cNvPr id="3" name="Notes Placeholder 2"/>
+          <p:cNvSpPr>
+            <a:spLocks noGrp="1"/>
+          </p:cNvSpPr>
+          <p:nvPr>
+            <p:ph type="body" idx="1"/>
+          </p:nvPr>
+        </p:nvSpPr>
+        <p:spPr/>
+        <p:txBody>
+          <a:bodyPr/>
+          <a:lstStyle/>
+          <a:p>
+            <a:endParaRPr lang="en-US"/>
+          </a:p>
+        </p:txBody>
+      </p:sp>
+      <p:sp>
+        <p:nvSpPr>
+          <p:cNvPr id="4" name="Slide Number Placeholder 3"/>
+          <p:cNvSpPr>
+            <a:spLocks noGrp="1"/>
+          </p:cNvSpPr>
+          <p:nvPr>
+            <p:ph type="sldNum" sz="quarter" idx="5"/>
+          </p:nvPr>
+        </p:nvSpPr>
+        <p:spPr/>
+        <p:txBody>
+          <a:bodyPr/>
+          <a:lstStyle/>
+          <a:p>
+            <a:fld id="{0994A99C-C3C3-4C26-B434-6E15DB6126A7}" type="slidenum">
+              <a:rPr lang="en-US" smtClean="0"/>
+              <a:t>6</a:t>
+            </a:fld>
+            <a:endParaRPr lang="en-US"/>
+          </a:p>
+        </p:txBody>
+      </p:sp>
+    </p:spTree>
+    <p:extLst>
+      <p:ext uri="{BB962C8B-B14F-4D97-AF65-F5344CB8AC3E}">
+        <p14:creationId xmlns:p14="http://schemas.microsoft.com/office/powerpoint/2010/main" val="4175577181"/>
+      </p:ext>
+    </p:extLst>
+  </p:cSld>
+  <p:clrMapOvr>
+    <a:masterClrMapping/>
+  </p:clrMapOvr>
+</p:notes>
 </file>
 
 <file path=ppt/slideLayouts/slideLayout1.xml><?xml version="1.0" encoding="utf-8"?>
@@ -18993,7 +19429,7 @@
           <p:nvPr/>
         </p:nvPicPr>
         <p:blipFill rotWithShape="1">
-          <a:blip r:embed="rId2"/>
+          <a:blip r:embed="rId3"/>
           <a:srcRect l="27703" r="34688" b="-1"/>
           <a:stretch/>
         </p:blipFill>
@@ -19061,10 +19497,10 @@
       </p:cxnSp>
       <p:pic>
         <p:nvPicPr>
-          <p:cNvPr id="5" name="Picture 4">
+          <p:cNvPr id="4" name="Picture 3">
             <a:extLst>
               <a:ext uri="{FF2B5EF4-FFF2-40B4-BE49-F238E27FC236}">
-                <a16:creationId xmlns:a16="http://schemas.microsoft.com/office/drawing/2014/main" id="{DA4C7F43-92A0-C85D-08BB-46B2DEA2F53C}"/>
+                <a16:creationId xmlns:a16="http://schemas.microsoft.com/office/drawing/2014/main" id="{6AFB5227-3970-A099-7C7D-35A5202C3178}"/>
               </a:ext>
             </a:extLst>
           </p:cNvPr>
@@ -19074,7 +19510,7 @@
           <p:nvPr/>
         </p:nvPicPr>
         <p:blipFill>
-          <a:blip r:embed="rId3">
+          <a:blip r:embed="rId4">
             <a:extLst>
               <a:ext uri="{28A0092B-C50C-407E-A947-70E740481C1C}">
                 <a14:useLocalDpi xmlns:a14="http://schemas.microsoft.com/office/drawing/2010/main" val="0"/>
@@ -19088,7 +19524,7 @@
         <p:spPr>
           <a:xfrm>
             <a:off x="0" y="0"/>
-            <a:ext cx="12192000" cy="6857990"/>
+            <a:ext cx="12192000" cy="6858000"/>
           </a:xfrm>
           <a:prstGeom prst="rect">
             <a:avLst/>
@@ -19368,4 +19804,299 @@
     </a:ext>
   </a:extLst>
 </a:theme>
+</file>
+
+<file path=ppt/theme/theme2.xml><?xml version="1.0" encoding="utf-8"?>
+<a:theme xmlns:a="http://schemas.openxmlformats.org/drawingml/2006/main" name="Office Theme">
+  <a:themeElements>
+    <a:clrScheme name="Office">
+      <a:dk1>
+        <a:sysClr val="windowText" lastClr="000000"/>
+      </a:dk1>
+      <a:lt1>
+        <a:sysClr val="window" lastClr="FFFFFF"/>
+      </a:lt1>
+      <a:dk2>
+        <a:srgbClr val="44546A"/>
+      </a:dk2>
+      <a:lt2>
+        <a:srgbClr val="E7E6E6"/>
+      </a:lt2>
+      <a:accent1>
+        <a:srgbClr val="4472C4"/>
+      </a:accent1>
+      <a:accent2>
+        <a:srgbClr val="ED7D31"/>
+      </a:accent2>
+      <a:accent3>
+        <a:srgbClr val="A5A5A5"/>
+      </a:accent3>
+      <a:accent4>
+        <a:srgbClr val="FFC000"/>
+      </a:accent4>
+      <a:accent5>
+        <a:srgbClr val="5B9BD5"/>
+      </a:accent5>
+      <a:accent6>
+        <a:srgbClr val="70AD47"/>
+      </a:accent6>
+      <a:hlink>
+        <a:srgbClr val="0563C1"/>
+      </a:hlink>
+      <a:folHlink>
+        <a:srgbClr val="954F72"/>
+      </a:folHlink>
+    </a:clrScheme>
+    <a:fontScheme name="Office">
+      <a:majorFont>
+        <a:latin typeface="Calibri Light" panose="020F0302020204030204"/>
+        <a:ea typeface=""/>
+        <a:cs typeface=""/>
+        <a:font script="Jpan" typeface="游ゴシック Light"/>
+        <a:font script="Hang" typeface="맑은 고딕"/>
+        <a:font script="Hans" typeface="等线 Light"/>
+        <a:font script="Hant" typeface="新細明體"/>
+        <a:font script="Arab" typeface="Times New Roman"/>
+        <a:font script="Hebr" typeface="Times New Roman"/>
+        <a:font script="Thai" typeface="Angsana New"/>
+        <a:font script="Ethi" typeface="Nyala"/>
+        <a:font script="Beng" typeface="Vrinda"/>
+        <a:font script="Gujr" typeface="Shruti"/>
+        <a:font script="Khmr" typeface="MoolBoran"/>
+        <a:font script="Knda" typeface="Tunga"/>
+        <a:font script="Guru" typeface="Raavi"/>
+        <a:font script="Cans" typeface="Euphemia"/>
+        <a:font script="Cher" typeface="Plantagenet Cherokee"/>
+        <a:font script="Yiii" typeface="Microsoft Yi Baiti"/>
+        <a:font script="Tibt" typeface="Microsoft Himalaya"/>
+        <a:font script="Thaa" typeface="MV Boli"/>
+        <a:font script="Deva" typeface="Mangal"/>
+        <a:font script="Telu" typeface="Gautami"/>
+        <a:font script="Taml" typeface="Latha"/>
+        <a:font script="Syrc" typeface="Estrangelo Edessa"/>
+        <a:font script="Orya" typeface="Kalinga"/>
+        <a:font script="Mlym" typeface="Kartika"/>
+        <a:font script="Laoo" typeface="DokChampa"/>
+        <a:font script="Sinh" typeface="Iskoola Pota"/>
+        <a:font script="Mong" typeface="Mongolian Baiti"/>
+        <a:font script="Viet" typeface="Times New Roman"/>
+        <a:font script="Uigh" typeface="Microsoft Uighur"/>
+        <a:font script="Geor" typeface="Sylfaen"/>
+        <a:font script="Armn" typeface="Arial"/>
+        <a:font script="Bugi" typeface="Leelawadee UI"/>
+        <a:font script="Bopo" typeface="Microsoft JhengHei"/>
+        <a:font script="Java" typeface="Javanese Text"/>
+        <a:font script="Lisu" typeface="Segoe UI"/>
+        <a:font script="Mymr" typeface="Myanmar Text"/>
+        <a:font script="Nkoo" typeface="Ebrima"/>
+        <a:font script="Olck" typeface="Nirmala UI"/>
+        <a:font script="Osma" typeface="Ebrima"/>
+        <a:font script="Phag" typeface="Phagspa"/>
+        <a:font script="Syrn" typeface="Estrangelo Edessa"/>
+        <a:font script="Syrj" typeface="Estrangelo Edessa"/>
+        <a:font script="Syre" typeface="Estrangelo Edessa"/>
+        <a:font script="Sora" typeface="Nirmala UI"/>
+        <a:font script="Tale" typeface="Microsoft Tai Le"/>
+        <a:font script="Talu" typeface="Microsoft New Tai Lue"/>
+        <a:font script="Tfng" typeface="Ebrima"/>
+      </a:majorFont>
+      <a:minorFont>
+        <a:latin typeface="Calibri" panose="020F0502020204030204"/>
+        <a:ea typeface=""/>
+        <a:cs typeface=""/>
+        <a:font script="Jpan" typeface="游ゴシック"/>
+        <a:font script="Hang" typeface="맑은 고딕"/>
+        <a:font script="Hans" typeface="等线"/>
+        <a:font script="Hant" typeface="新細明體"/>
+        <a:font script="Arab" typeface="Arial"/>
+        <a:font script="Hebr" typeface="Arial"/>
+        <a:font script="Thai" typeface="Cordia New"/>
+        <a:font script="Ethi" typeface="Nyala"/>
+        <a:font script="Beng" typeface="Vrinda"/>
+        <a:font script="Gujr" typeface="Shruti"/>
+        <a:font script="Khmr" typeface="DaunPenh"/>
+        <a:font script="Knda" typeface="Tunga"/>
+        <a:font script="Guru" typeface="Raavi"/>
+        <a:font script="Cans" typeface="Euphemia"/>
+        <a:font script="Cher" typeface="Plantagenet Cherokee"/>
+        <a:font script="Yiii" typeface="Microsoft Yi Baiti"/>
+        <a:font script="Tibt" typeface="Microsoft Himalaya"/>
+        <a:font script="Thaa" typeface="MV Boli"/>
+        <a:font script="Deva" typeface="Mangal"/>
+        <a:font script="Telu" typeface="Gautami"/>
+        <a:font script="Taml" typeface="Latha"/>
+        <a:font script="Syrc" typeface="Estrangelo Edessa"/>
+        <a:font script="Orya" typeface="Kalinga"/>
+        <a:font script="Mlym" typeface="Kartika"/>
+        <a:font script="Laoo" typeface="DokChampa"/>
+        <a:font script="Sinh" typeface="Iskoola Pota"/>
+        <a:font script="Mong" typeface="Mongolian Baiti"/>
+        <a:font script="Viet" typeface="Arial"/>
+        <a:font script="Uigh" typeface="Microsoft Uighur"/>
+        <a:font script="Geor" typeface="Sylfaen"/>
+        <a:font script="Armn" typeface="Arial"/>
+        <a:font script="Bugi" typeface="Leelawadee UI"/>
+        <a:font script="Bopo" typeface="Microsoft JhengHei"/>
+        <a:font script="Java" typeface="Javanese Text"/>
+        <a:font script="Lisu" typeface="Segoe UI"/>
+        <a:font script="Mymr" typeface="Myanmar Text"/>
+        <a:font script="Nkoo" typeface="Ebrima"/>
+        <a:font script="Olck" typeface="Nirmala UI"/>
+        <a:font script="Osma" typeface="Ebrima"/>
+        <a:font script="Phag" typeface="Phagspa"/>
+        <a:font script="Syrn" typeface="Estrangelo Edessa"/>
+        <a:font script="Syrj" typeface="Estrangelo Edessa"/>
+        <a:font script="Syre" typeface="Estrangelo Edessa"/>
+        <a:font script="Sora" typeface="Nirmala UI"/>
+        <a:font script="Tale" typeface="Microsoft Tai Le"/>
+        <a:font script="Talu" typeface="Microsoft New Tai Lue"/>
+        <a:font script="Tfng" typeface="Ebrima"/>
+      </a:minorFont>
+    </a:fontScheme>
+    <a:fmtScheme name="Office">
+      <a:fillStyleLst>
+        <a:solidFill>
+          <a:schemeClr val="phClr"/>
+        </a:solidFill>
+        <a:gradFill rotWithShape="1">
+          <a:gsLst>
+            <a:gs pos="0">
+              <a:schemeClr val="phClr">
+                <a:lumMod val="110000"/>
+                <a:satMod val="105000"/>
+                <a:tint val="67000"/>
+              </a:schemeClr>
+            </a:gs>
+            <a:gs pos="50000">
+              <a:schemeClr val="phClr">
+                <a:lumMod val="105000"/>
+                <a:satMod val="103000"/>
+                <a:tint val="73000"/>
+              </a:schemeClr>
+            </a:gs>
+            <a:gs pos="100000">
+              <a:schemeClr val="phClr">
+                <a:lumMod val="105000"/>
+                <a:satMod val="109000"/>
+                <a:tint val="81000"/>
+              </a:schemeClr>
+            </a:gs>
+          </a:gsLst>
+          <a:lin ang="5400000" scaled="0"/>
+        </a:gradFill>
+        <a:gradFill rotWithShape="1">
+          <a:gsLst>
+            <a:gs pos="0">
+              <a:schemeClr val="phClr">
+                <a:satMod val="103000"/>
+                <a:lumMod val="102000"/>
+                <a:tint val="94000"/>
+              </a:schemeClr>
+            </a:gs>
+            <a:gs pos="50000">
+              <a:schemeClr val="phClr">
+                <a:satMod val="110000"/>
+                <a:lumMod val="100000"/>
+                <a:shade val="100000"/>
+              </a:schemeClr>
+            </a:gs>
+            <a:gs pos="100000">
+              <a:schemeClr val="phClr">
+                <a:lumMod val="99000"/>
+                <a:satMod val="120000"/>
+                <a:shade val="78000"/>
+              </a:schemeClr>
+            </a:gs>
+          </a:gsLst>
+          <a:lin ang="5400000" scaled="0"/>
+        </a:gradFill>
+      </a:fillStyleLst>
+      <a:lnStyleLst>
+        <a:ln w="6350" cap="flat" cmpd="sng" algn="ctr">
+          <a:solidFill>
+            <a:schemeClr val="phClr"/>
+          </a:solidFill>
+          <a:prstDash val="solid"/>
+          <a:miter lim="800000"/>
+        </a:ln>
+        <a:ln w="12700" cap="flat" cmpd="sng" algn="ctr">
+          <a:solidFill>
+            <a:schemeClr val="phClr"/>
+          </a:solidFill>
+          <a:prstDash val="solid"/>
+          <a:miter lim="800000"/>
+        </a:ln>
+        <a:ln w="19050" cap="flat" cmpd="sng" algn="ctr">
+          <a:solidFill>
+            <a:schemeClr val="phClr"/>
+          </a:solidFill>
+          <a:prstDash val="solid"/>
+          <a:miter lim="800000"/>
+        </a:ln>
+      </a:lnStyleLst>
+      <a:effectStyleLst>
+        <a:effectStyle>
+          <a:effectLst/>
+        </a:effectStyle>
+        <a:effectStyle>
+          <a:effectLst/>
+        </a:effectStyle>
+        <a:effectStyle>
+          <a:effectLst>
+            <a:outerShdw blurRad="57150" dist="19050" dir="5400000" algn="ctr" rotWithShape="0">
+              <a:srgbClr val="000000">
+                <a:alpha val="63000"/>
+              </a:srgbClr>
+            </a:outerShdw>
+          </a:effectLst>
+        </a:effectStyle>
+      </a:effectStyleLst>
+      <a:bgFillStyleLst>
+        <a:solidFill>
+          <a:schemeClr val="phClr"/>
+        </a:solidFill>
+        <a:solidFill>
+          <a:schemeClr val="phClr">
+            <a:tint val="95000"/>
+            <a:satMod val="170000"/>
+          </a:schemeClr>
+        </a:solidFill>
+        <a:gradFill rotWithShape="1">
+          <a:gsLst>
+            <a:gs pos="0">
+              <a:schemeClr val="phClr">
+                <a:tint val="93000"/>
+                <a:satMod val="150000"/>
+                <a:shade val="98000"/>
+                <a:lumMod val="102000"/>
+              </a:schemeClr>
+            </a:gs>
+            <a:gs pos="50000">
+              <a:schemeClr val="phClr">
+                <a:tint val="98000"/>
+                <a:satMod val="130000"/>
+                <a:shade val="90000"/>
+                <a:lumMod val="103000"/>
+              </a:schemeClr>
+            </a:gs>
+            <a:gs pos="100000">
+              <a:schemeClr val="phClr">
+                <a:shade val="63000"/>
+                <a:satMod val="120000"/>
+              </a:schemeClr>
+            </a:gs>
+          </a:gsLst>
+          <a:lin ang="5400000" scaled="0"/>
+        </a:gradFill>
+      </a:bgFillStyleLst>
+    </a:fmtScheme>
+  </a:themeElements>
+  <a:objectDefaults/>
+  <a:extraClrSchemeLst/>
+  <a:extLst>
+    <a:ext uri="{05A4C25C-085E-4340-85A3-A5531E510DB2}">
+      <thm15:themeFamily xmlns:thm15="http://schemas.microsoft.com/office/thememl/2012/main" name="Office Theme" id="{62F939B6-93AF-4DB8-9C6B-D6C7DFDC589F}" vid="{4A3C46E8-61CC-4603-A589-7422A47A8E4A}"/>
+    </a:ext>
+  </a:extLst>
+</a:theme>
 </file>
</xml_diff>